<commit_message>
added day/time information to intro
</commit_message>
<xml_diff>
--- a/doc/slides/day2/session1/SamFormatAndFiltering.pptx
+++ b/doc/slides/day2/session1/SamFormatAndFiltering.pptx
@@ -4,8 +4,11 @@
   <p:sldMasterIdLst>
     <p:sldMasterId id="2147483648" r:id="rId1"/>
   </p:sldMasterIdLst>
+  <p:notesMasterIdLst>
+    <p:notesMasterId r:id="rId9"/>
+  </p:notesMasterIdLst>
   <p:sldIdLst>
-    <p:sldId id="256" r:id="rId2"/>
+    <p:sldId id="263" r:id="rId2"/>
     <p:sldId id="257" r:id="rId3"/>
     <p:sldId id="258" r:id="rId4"/>
     <p:sldId id="261" r:id="rId5"/>
@@ -113,6 +116,447 @@
 </p:presentation>
 </file>
 
+<file path=ppt/notesMasters/notesMaster1.xml><?xml version="1.0" encoding="utf-8"?>
+<p:notesMaster xmlns:a="http://schemas.openxmlformats.org/drawingml/2006/main" xmlns:r="http://schemas.openxmlformats.org/officeDocument/2006/relationships" xmlns:mc="http://schemas.openxmlformats.org/markup-compatibility/2006" xmlns:mv="urn:schemas-microsoft-com:mac:vml" xmlns:p="http://schemas.openxmlformats.org/presentationml/2006/main" mc:Ignorable="mv" mc:PreserveAttributes="mv:*">
+  <p:cSld>
+    <p:bg>
+      <p:bgRef idx="1001">
+        <a:schemeClr val="bg1"/>
+      </p:bgRef>
+    </p:bg>
+    <p:spTree>
+      <p:nvGrpSpPr>
+        <p:cNvPr id="1" name=""/>
+        <p:cNvGrpSpPr/>
+        <p:nvPr/>
+      </p:nvGrpSpPr>
+      <p:grpSpPr>
+        <a:xfrm>
+          <a:off x="0" y="0"/>
+          <a:ext cx="0" cy="0"/>
+          <a:chOff x="0" y="0"/>
+          <a:chExt cx="0" cy="0"/>
+        </a:xfrm>
+      </p:grpSpPr>
+      <p:sp>
+        <p:nvSpPr>
+          <p:cNvPr id="2" name="Header Placeholder 1"/>
+          <p:cNvSpPr>
+            <a:spLocks noGrp="1"/>
+          </p:cNvSpPr>
+          <p:nvPr>
+            <p:ph type="hdr" sz="quarter"/>
+          </p:nvPr>
+        </p:nvSpPr>
+        <p:spPr>
+          <a:xfrm>
+            <a:off x="0" y="0"/>
+            <a:ext cx="2971800" cy="457200"/>
+          </a:xfrm>
+          <a:prstGeom prst="rect">
+            <a:avLst/>
+          </a:prstGeom>
+        </p:spPr>
+        <p:txBody>
+          <a:bodyPr vert="horz" lIns="91440" tIns="45720" rIns="91440" bIns="45720" rtlCol="0"/>
+          <a:lstStyle>
+            <a:lvl1pPr algn="l">
+              <a:defRPr sz="1200"/>
+            </a:lvl1pPr>
+          </a:lstStyle>
+          <a:p>
+            <a:endParaRPr lang="en-US"/>
+          </a:p>
+        </p:txBody>
+      </p:sp>
+      <p:sp>
+        <p:nvSpPr>
+          <p:cNvPr id="3" name="Date Placeholder 2"/>
+          <p:cNvSpPr>
+            <a:spLocks noGrp="1"/>
+          </p:cNvSpPr>
+          <p:nvPr>
+            <p:ph type="dt" idx="1"/>
+          </p:nvPr>
+        </p:nvSpPr>
+        <p:spPr>
+          <a:xfrm>
+            <a:off x="3884613" y="0"/>
+            <a:ext cx="2971800" cy="457200"/>
+          </a:xfrm>
+          <a:prstGeom prst="rect">
+            <a:avLst/>
+          </a:prstGeom>
+        </p:spPr>
+        <p:txBody>
+          <a:bodyPr vert="horz" lIns="91440" tIns="45720" rIns="91440" bIns="45720" rtlCol="0"/>
+          <a:lstStyle>
+            <a:lvl1pPr algn="r">
+              <a:defRPr sz="1200"/>
+            </a:lvl1pPr>
+          </a:lstStyle>
+          <a:p>
+            <a:fld id="{11D2843E-FABA-5647-BE09-469D1564CF94}" type="datetimeFigureOut">
+              <a:rPr lang="en-US" smtClean="0"/>
+              <a:t>9/8/12</a:t>
+            </a:fld>
+            <a:endParaRPr lang="en-US"/>
+          </a:p>
+        </p:txBody>
+      </p:sp>
+      <p:sp>
+        <p:nvSpPr>
+          <p:cNvPr id="4" name="Slide Image Placeholder 3"/>
+          <p:cNvSpPr>
+            <a:spLocks noGrp="1" noRot="1" noChangeAspect="1"/>
+          </p:cNvSpPr>
+          <p:nvPr>
+            <p:ph type="sldImg" idx="2"/>
+          </p:nvPr>
+        </p:nvSpPr>
+        <p:spPr>
+          <a:xfrm>
+            <a:off x="1143000" y="685800"/>
+            <a:ext cx="4572000" cy="3429000"/>
+          </a:xfrm>
+          <a:prstGeom prst="rect">
+            <a:avLst/>
+          </a:prstGeom>
+          <a:noFill/>
+          <a:ln w="12700">
+            <a:solidFill>
+              <a:prstClr val="black"/>
+            </a:solidFill>
+          </a:ln>
+        </p:spPr>
+        <p:txBody>
+          <a:bodyPr vert="horz" lIns="91440" tIns="45720" rIns="91440" bIns="45720" rtlCol="0" anchor="ctr"/>
+          <a:lstStyle/>
+          <a:p>
+            <a:endParaRPr lang="en-US"/>
+          </a:p>
+        </p:txBody>
+      </p:sp>
+      <p:sp>
+        <p:nvSpPr>
+          <p:cNvPr id="5" name="Notes Placeholder 4"/>
+          <p:cNvSpPr>
+            <a:spLocks noGrp="1"/>
+          </p:cNvSpPr>
+          <p:nvPr>
+            <p:ph type="body" sz="quarter" idx="3"/>
+          </p:nvPr>
+        </p:nvSpPr>
+        <p:spPr>
+          <a:xfrm>
+            <a:off x="685800" y="4343400"/>
+            <a:ext cx="5486400" cy="4114800"/>
+          </a:xfrm>
+          <a:prstGeom prst="rect">
+            <a:avLst/>
+          </a:prstGeom>
+        </p:spPr>
+        <p:txBody>
+          <a:bodyPr vert="horz" lIns="91440" tIns="45720" rIns="91440" bIns="45720" rtlCol="0">
+            <a:normAutofit/>
+          </a:bodyPr>
+          <a:lstStyle/>
+          <a:p>
+            <a:pPr lvl="0"/>
+            <a:r>
+              <a:rPr lang="en-US" smtClean="0"/>
+              <a:t>Click to edit Master text styles</a:t>
+            </a:r>
+          </a:p>
+          <a:p>
+            <a:pPr lvl="1"/>
+            <a:r>
+              <a:rPr lang="en-US" smtClean="0"/>
+              <a:t>Second level</a:t>
+            </a:r>
+          </a:p>
+          <a:p>
+            <a:pPr lvl="2"/>
+            <a:r>
+              <a:rPr lang="en-US" smtClean="0"/>
+              <a:t>Third level</a:t>
+            </a:r>
+          </a:p>
+          <a:p>
+            <a:pPr lvl="3"/>
+            <a:r>
+              <a:rPr lang="en-US" smtClean="0"/>
+              <a:t>Fourth level</a:t>
+            </a:r>
+          </a:p>
+          <a:p>
+            <a:pPr lvl="4"/>
+            <a:r>
+              <a:rPr lang="en-US" smtClean="0"/>
+              <a:t>Fifth level</a:t>
+            </a:r>
+            <a:endParaRPr lang="en-US"/>
+          </a:p>
+        </p:txBody>
+      </p:sp>
+      <p:sp>
+        <p:nvSpPr>
+          <p:cNvPr id="6" name="Footer Placeholder 5"/>
+          <p:cNvSpPr>
+            <a:spLocks noGrp="1"/>
+          </p:cNvSpPr>
+          <p:nvPr>
+            <p:ph type="ftr" sz="quarter" idx="4"/>
+          </p:nvPr>
+        </p:nvSpPr>
+        <p:spPr>
+          <a:xfrm>
+            <a:off x="0" y="8685213"/>
+            <a:ext cx="2971800" cy="457200"/>
+          </a:xfrm>
+          <a:prstGeom prst="rect">
+            <a:avLst/>
+          </a:prstGeom>
+        </p:spPr>
+        <p:txBody>
+          <a:bodyPr vert="horz" lIns="91440" tIns="45720" rIns="91440" bIns="45720" rtlCol="0" anchor="b"/>
+          <a:lstStyle>
+            <a:lvl1pPr algn="l">
+              <a:defRPr sz="1200"/>
+            </a:lvl1pPr>
+          </a:lstStyle>
+          <a:p>
+            <a:endParaRPr lang="en-US"/>
+          </a:p>
+        </p:txBody>
+      </p:sp>
+      <p:sp>
+        <p:nvSpPr>
+          <p:cNvPr id="7" name="Slide Number Placeholder 6"/>
+          <p:cNvSpPr>
+            <a:spLocks noGrp="1"/>
+          </p:cNvSpPr>
+          <p:nvPr>
+            <p:ph type="sldNum" sz="quarter" idx="5"/>
+          </p:nvPr>
+        </p:nvSpPr>
+        <p:spPr>
+          <a:xfrm>
+            <a:off x="3884613" y="8685213"/>
+            <a:ext cx="2971800" cy="457200"/>
+          </a:xfrm>
+          <a:prstGeom prst="rect">
+            <a:avLst/>
+          </a:prstGeom>
+        </p:spPr>
+        <p:txBody>
+          <a:bodyPr vert="horz" lIns="91440" tIns="45720" rIns="91440" bIns="45720" rtlCol="0" anchor="b"/>
+          <a:lstStyle>
+            <a:lvl1pPr algn="r">
+              <a:defRPr sz="1200"/>
+            </a:lvl1pPr>
+          </a:lstStyle>
+          <a:p>
+            <a:fld id="{C7D22C1A-5C65-4B44-A3E8-333699168EE8}" type="slidenum">
+              <a:rPr lang="en-US" smtClean="0"/>
+              <a:t>‹#›</a:t>
+            </a:fld>
+            <a:endParaRPr lang="en-US"/>
+          </a:p>
+        </p:txBody>
+      </p:sp>
+    </p:spTree>
+  </p:cSld>
+  <p:clrMap bg1="lt1" tx1="dk1" bg2="lt2" tx2="dk2" accent1="accent1" accent2="accent2" accent3="accent3" accent4="accent4" accent5="accent5" accent6="accent6" hlink="hlink" folHlink="folHlink"/>
+  <p:notesStyle>
+    <a:lvl1pPr marL="0" algn="l" defTabSz="457200" rtl="0" eaLnBrk="1" latinLnBrk="0" hangingPunct="1">
+      <a:defRPr sz="1200" kern="1200">
+        <a:solidFill>
+          <a:schemeClr val="tx1"/>
+        </a:solidFill>
+        <a:latin typeface="+mn-lt"/>
+        <a:ea typeface="+mn-ea"/>
+        <a:cs typeface="+mn-cs"/>
+      </a:defRPr>
+    </a:lvl1pPr>
+    <a:lvl2pPr marL="457200" algn="l" defTabSz="457200" rtl="0" eaLnBrk="1" latinLnBrk="0" hangingPunct="1">
+      <a:defRPr sz="1200" kern="1200">
+        <a:solidFill>
+          <a:schemeClr val="tx1"/>
+        </a:solidFill>
+        <a:latin typeface="+mn-lt"/>
+        <a:ea typeface="+mn-ea"/>
+        <a:cs typeface="+mn-cs"/>
+      </a:defRPr>
+    </a:lvl2pPr>
+    <a:lvl3pPr marL="914400" algn="l" defTabSz="457200" rtl="0" eaLnBrk="1" latinLnBrk="0" hangingPunct="1">
+      <a:defRPr sz="1200" kern="1200">
+        <a:solidFill>
+          <a:schemeClr val="tx1"/>
+        </a:solidFill>
+        <a:latin typeface="+mn-lt"/>
+        <a:ea typeface="+mn-ea"/>
+        <a:cs typeface="+mn-cs"/>
+      </a:defRPr>
+    </a:lvl3pPr>
+    <a:lvl4pPr marL="1371600" algn="l" defTabSz="457200" rtl="0" eaLnBrk="1" latinLnBrk="0" hangingPunct="1">
+      <a:defRPr sz="1200" kern="1200">
+        <a:solidFill>
+          <a:schemeClr val="tx1"/>
+        </a:solidFill>
+        <a:latin typeface="+mn-lt"/>
+        <a:ea typeface="+mn-ea"/>
+        <a:cs typeface="+mn-cs"/>
+      </a:defRPr>
+    </a:lvl4pPr>
+    <a:lvl5pPr marL="1828800" algn="l" defTabSz="457200" rtl="0" eaLnBrk="1" latinLnBrk="0" hangingPunct="1">
+      <a:defRPr sz="1200" kern="1200">
+        <a:solidFill>
+          <a:schemeClr val="tx1"/>
+        </a:solidFill>
+        <a:latin typeface="+mn-lt"/>
+        <a:ea typeface="+mn-ea"/>
+        <a:cs typeface="+mn-cs"/>
+      </a:defRPr>
+    </a:lvl5pPr>
+    <a:lvl6pPr marL="2286000" algn="l" defTabSz="457200" rtl="0" eaLnBrk="1" latinLnBrk="0" hangingPunct="1">
+      <a:defRPr sz="1200" kern="1200">
+        <a:solidFill>
+          <a:schemeClr val="tx1"/>
+        </a:solidFill>
+        <a:latin typeface="+mn-lt"/>
+        <a:ea typeface="+mn-ea"/>
+        <a:cs typeface="+mn-cs"/>
+      </a:defRPr>
+    </a:lvl6pPr>
+    <a:lvl7pPr marL="2743200" algn="l" defTabSz="457200" rtl="0" eaLnBrk="1" latinLnBrk="0" hangingPunct="1">
+      <a:defRPr sz="1200" kern="1200">
+        <a:solidFill>
+          <a:schemeClr val="tx1"/>
+        </a:solidFill>
+        <a:latin typeface="+mn-lt"/>
+        <a:ea typeface="+mn-ea"/>
+        <a:cs typeface="+mn-cs"/>
+      </a:defRPr>
+    </a:lvl7pPr>
+    <a:lvl8pPr marL="3200400" algn="l" defTabSz="457200" rtl="0" eaLnBrk="1" latinLnBrk="0" hangingPunct="1">
+      <a:defRPr sz="1200" kern="1200">
+        <a:solidFill>
+          <a:schemeClr val="tx1"/>
+        </a:solidFill>
+        <a:latin typeface="+mn-lt"/>
+        <a:ea typeface="+mn-ea"/>
+        <a:cs typeface="+mn-cs"/>
+      </a:defRPr>
+    </a:lvl8pPr>
+    <a:lvl9pPr marL="3657600" algn="l" defTabSz="457200" rtl="0" eaLnBrk="1" latinLnBrk="0" hangingPunct="1">
+      <a:defRPr sz="1200" kern="1200">
+        <a:solidFill>
+          <a:schemeClr val="tx1"/>
+        </a:solidFill>
+        <a:latin typeface="+mn-lt"/>
+        <a:ea typeface="+mn-ea"/>
+        <a:cs typeface="+mn-cs"/>
+      </a:defRPr>
+    </a:lvl9pPr>
+  </p:notesStyle>
+</p:notesMaster>
+</file>
+
+<file path=ppt/notesSlides/notesSlide1.xml><?xml version="1.0" encoding="utf-8"?>
+<p:notes xmlns:a="http://schemas.openxmlformats.org/drawingml/2006/main" xmlns:r="http://schemas.openxmlformats.org/officeDocument/2006/relationships" xmlns:mc="http://schemas.openxmlformats.org/markup-compatibility/2006" xmlns:mv="urn:schemas-microsoft-com:mac:vml" xmlns:p="http://schemas.openxmlformats.org/presentationml/2006/main" mc:Ignorable="mv" mc:PreserveAttributes="mv:*">
+  <p:cSld>
+    <p:spTree>
+      <p:nvGrpSpPr>
+        <p:cNvPr id="1" name=""/>
+        <p:cNvGrpSpPr/>
+        <p:nvPr/>
+      </p:nvGrpSpPr>
+      <p:grpSpPr>
+        <a:xfrm>
+          <a:off x="0" y="0"/>
+          <a:ext cx="0" cy="0"/>
+          <a:chOff x="0" y="0"/>
+          <a:chExt cx="0" cy="0"/>
+        </a:xfrm>
+      </p:grpSpPr>
+      <p:sp>
+        <p:nvSpPr>
+          <p:cNvPr id="2" name="Slide Image Placeholder 1"/>
+          <p:cNvSpPr>
+            <a:spLocks noGrp="1" noRot="1" noChangeAspect="1"/>
+          </p:cNvSpPr>
+          <p:nvPr>
+            <p:ph type="sldImg"/>
+          </p:nvPr>
+        </p:nvSpPr>
+        <p:spPr/>
+      </p:sp>
+      <p:sp>
+        <p:nvSpPr>
+          <p:cNvPr id="3" name="Notes Placeholder 2"/>
+          <p:cNvSpPr>
+            <a:spLocks noGrp="1"/>
+          </p:cNvSpPr>
+          <p:nvPr>
+            <p:ph type="body" idx="1"/>
+          </p:nvPr>
+        </p:nvSpPr>
+        <p:spPr/>
+        <p:txBody>
+          <a:bodyPr>
+            <a:normAutofit/>
+          </a:bodyPr>
+          <a:lstStyle/>
+          <a:p>
+            <a:r>
+              <a:rPr lang="en-US" dirty="0" smtClean="0"/>
+              <a:t>The progression of a research</a:t>
+            </a:r>
+            <a:r>
+              <a:rPr lang="en-US" baseline="0" dirty="0" smtClean="0"/>
+              <a:t> project, dependencies from one step to the next. </a:t>
+            </a:r>
+            <a:r>
+              <a:rPr lang="en-US" baseline="0" smtClean="0"/>
+              <a:t>Exercise: scripting steps together.</a:t>
+            </a:r>
+            <a:endParaRPr lang="en-US" dirty="0"/>
+          </a:p>
+        </p:txBody>
+      </p:sp>
+      <p:sp>
+        <p:nvSpPr>
+          <p:cNvPr id="4" name="Slide Number Placeholder 3"/>
+          <p:cNvSpPr>
+            <a:spLocks noGrp="1"/>
+          </p:cNvSpPr>
+          <p:nvPr>
+            <p:ph type="sldNum" sz="quarter" idx="10"/>
+          </p:nvPr>
+        </p:nvSpPr>
+        <p:spPr/>
+        <p:txBody>
+          <a:bodyPr/>
+          <a:lstStyle/>
+          <a:p>
+            <a:fld id="{BD3AE5F8-5BBE-9040-829F-14E86114274F}" type="slidenum">
+              <a:rPr lang="en-US" smtClean="0"/>
+              <a:pPr/>
+              <a:t>1</a:t>
+            </a:fld>
+            <a:endParaRPr lang="en-US"/>
+          </a:p>
+        </p:txBody>
+      </p:sp>
+    </p:spTree>
+  </p:cSld>
+  <p:clrMapOvr>
+    <a:masterClrMapping/>
+  </p:clrMapOvr>
+</p:notes>
+</file>
+
 <file path=ppt/slideLayouts/slideLayout1.xml><?xml version="1.0" encoding="utf-8"?>
 <p:sldLayout xmlns:a="http://schemas.openxmlformats.org/drawingml/2006/main" xmlns:r="http://schemas.openxmlformats.org/officeDocument/2006/relationships" xmlns:mc="http://schemas.openxmlformats.org/markup-compatibility/2006" xmlns:mv="urn:schemas-microsoft-com:mac:vml" xmlns:p="http://schemas.openxmlformats.org/presentationml/2006/main" mc:Ignorable="mv" mc:PreserveAttributes="mv:*" type="title" preserve="1">
   <p:cSld name="Title Slide">
@@ -295,7 +739,7 @@
             <a:fld id="{92EB5B03-E054-B54F-97A5-9471F82931B5}" type="datetimeFigureOut">
               <a:rPr lang="en-US" smtClean="0"/>
               <a:pPr/>
-              <a:t>9/6/12</a:t>
+              <a:t>9/8/12</a:t>
             </a:fld>
             <a:endParaRPr lang="en-US"/>
           </a:p>
@@ -462,7 +906,7 @@
             <a:fld id="{92EB5B03-E054-B54F-97A5-9471F82931B5}" type="datetimeFigureOut">
               <a:rPr lang="en-US" smtClean="0"/>
               <a:pPr/>
-              <a:t>9/6/12</a:t>
+              <a:t>9/8/12</a:t>
             </a:fld>
             <a:endParaRPr lang="en-US"/>
           </a:p>
@@ -639,7 +1083,7 @@
             <a:fld id="{92EB5B03-E054-B54F-97A5-9471F82931B5}" type="datetimeFigureOut">
               <a:rPr lang="en-US" smtClean="0"/>
               <a:pPr/>
-              <a:t>9/6/12</a:t>
+              <a:t>9/8/12</a:t>
             </a:fld>
             <a:endParaRPr lang="en-US"/>
           </a:p>
@@ -806,7 +1250,7 @@
             <a:fld id="{92EB5B03-E054-B54F-97A5-9471F82931B5}" type="datetimeFigureOut">
               <a:rPr lang="en-US" smtClean="0"/>
               <a:pPr/>
-              <a:t>9/6/12</a:t>
+              <a:t>9/8/12</a:t>
             </a:fld>
             <a:endParaRPr lang="en-US"/>
           </a:p>
@@ -1049,7 +1493,7 @@
             <a:fld id="{92EB5B03-E054-B54F-97A5-9471F82931B5}" type="datetimeFigureOut">
               <a:rPr lang="en-US" smtClean="0"/>
               <a:pPr/>
-              <a:t>9/6/12</a:t>
+              <a:t>9/8/12</a:t>
             </a:fld>
             <a:endParaRPr lang="en-US"/>
           </a:p>
@@ -1334,7 +1778,7 @@
             <a:fld id="{92EB5B03-E054-B54F-97A5-9471F82931B5}" type="datetimeFigureOut">
               <a:rPr lang="en-US" smtClean="0"/>
               <a:pPr/>
-              <a:t>9/6/12</a:t>
+              <a:t>9/8/12</a:t>
             </a:fld>
             <a:endParaRPr lang="en-US"/>
           </a:p>
@@ -1753,7 +2197,7 @@
             <a:fld id="{92EB5B03-E054-B54F-97A5-9471F82931B5}" type="datetimeFigureOut">
               <a:rPr lang="en-US" smtClean="0"/>
               <a:pPr/>
-              <a:t>9/6/12</a:t>
+              <a:t>9/8/12</a:t>
             </a:fld>
             <a:endParaRPr lang="en-US"/>
           </a:p>
@@ -1868,7 +2312,7 @@
             <a:fld id="{92EB5B03-E054-B54F-97A5-9471F82931B5}" type="datetimeFigureOut">
               <a:rPr lang="en-US" smtClean="0"/>
               <a:pPr/>
-              <a:t>9/6/12</a:t>
+              <a:t>9/8/12</a:t>
             </a:fld>
             <a:endParaRPr lang="en-US"/>
           </a:p>
@@ -1960,7 +2404,7 @@
             <a:fld id="{92EB5B03-E054-B54F-97A5-9471F82931B5}" type="datetimeFigureOut">
               <a:rPr lang="en-US" smtClean="0"/>
               <a:pPr/>
-              <a:t>9/6/12</a:t>
+              <a:t>9/8/12</a:t>
             </a:fld>
             <a:endParaRPr lang="en-US"/>
           </a:p>
@@ -2234,7 +2678,7 @@
             <a:fld id="{92EB5B03-E054-B54F-97A5-9471F82931B5}" type="datetimeFigureOut">
               <a:rPr lang="en-US" smtClean="0"/>
               <a:pPr/>
-              <a:t>9/6/12</a:t>
+              <a:t>9/8/12</a:t>
             </a:fld>
             <a:endParaRPr lang="en-US"/>
           </a:p>
@@ -2484,7 +2928,7 @@
             <a:fld id="{92EB5B03-E054-B54F-97A5-9471F82931B5}" type="datetimeFigureOut">
               <a:rPr lang="en-US" smtClean="0"/>
               <a:pPr/>
-              <a:t>9/6/12</a:t>
+              <a:t>9/8/12</a:t>
             </a:fld>
             <a:endParaRPr lang="en-US"/>
           </a:p>
@@ -2694,7 +3138,7 @@
             <a:fld id="{92EB5B03-E054-B54F-97A5-9471F82931B5}" type="datetimeFigureOut">
               <a:rPr lang="en-US" smtClean="0"/>
               <a:pPr/>
-              <a:t>9/6/12</a:t>
+              <a:t>9/8/12</a:t>
             </a:fld>
             <a:endParaRPr lang="en-US"/>
           </a:p>
@@ -3082,7 +3526,46 @@
           <a:p>
             <a:r>
               <a:rPr lang="en-US" dirty="0" smtClean="0"/>
-              <a:t>Sam Filtering</a:t>
+              <a:t>Sam</a:t>
+            </a:r>
+            <a:r>
+              <a:rPr lang="en-US" dirty="0" smtClean="0"/>
+              <a:t> Format &amp; Filtering</a:t>
+            </a:r>
+            <a:endParaRPr lang="en-US" dirty="0"/>
+          </a:p>
+        </p:txBody>
+      </p:sp>
+      <p:sp>
+        <p:nvSpPr>
+          <p:cNvPr id="3" name="Subtitle 2"/>
+          <p:cNvSpPr>
+            <a:spLocks noGrp="1"/>
+          </p:cNvSpPr>
+          <p:nvPr>
+            <p:ph type="subTitle" idx="1"/>
+          </p:nvPr>
+        </p:nvSpPr>
+        <p:spPr/>
+        <p:txBody>
+          <a:bodyPr/>
+          <a:lstStyle/>
+          <a:p>
+            <a:r>
+              <a:rPr lang="en-US" dirty="0" smtClean="0"/>
+              <a:t>12 September 2012,</a:t>
+            </a:r>
+            <a:r>
+              <a:rPr lang="en-US" dirty="0" smtClean="0"/>
+              <a:t> 10.00</a:t>
+            </a:r>
+            <a:r>
+              <a:rPr lang="en-US" dirty="0" smtClean="0"/>
+              <a:t>-</a:t>
+            </a:r>
+            <a:r>
+              <a:rPr lang="en-US" dirty="0" smtClean="0"/>
+              <a:t>10.30</a:t>
             </a:r>
             <a:endParaRPr lang="en-US" dirty="0"/>
           </a:p>
@@ -3893,15 +4376,7 @@
             </a:r>
             <a:r>
               <a:rPr lang="en-US" dirty="0" smtClean="0"/>
-              <a:t> script to filter either aligned or unaligned entries in SAM STDIN to STDOUT along with the Sam</a:t>
-            </a:r>
-            <a:r>
-              <a:rPr lang="en-US" dirty="0" smtClean="0"/>
-              <a:t> headers </a:t>
-            </a:r>
-            <a:r>
-              <a:rPr lang="en-US" dirty="0" smtClean="0"/>
-              <a:t>(use a </a:t>
+              <a:t> script to filter either aligned or unaligned entries in SAM STDIN to STDOUT along with the Sam headers (use a </a:t>
             </a:r>
             <a:r>
               <a:rPr lang="en-US" dirty="0" err="1" smtClean="0"/>
@@ -3919,19 +4394,7 @@
             </a:r>
             <a:r>
               <a:rPr lang="en-US" smtClean="0"/>
-              <a:t>in</a:t>
-            </a:r>
-            <a:r>
-              <a:rPr lang="en-US" smtClean="0"/>
-              <a:t> </a:t>
-            </a:r>
-            <a:r>
-              <a:rPr lang="en-US" smtClean="0"/>
-              <a:t>Exercise </a:t>
-            </a:r>
-            <a:r>
-              <a:rPr lang="en-US" smtClean="0"/>
-              <a:t>1 </a:t>
+              <a:t>in Exercise 1 </a:t>
             </a:r>
             <a:r>
               <a:rPr lang="en-US" dirty="0" smtClean="0"/>
@@ -4295,4 +4758,322 @@
   </a:objectDefaults>
   <a:extraClrSchemeLst/>
 </a:theme>
+</file>
+
+<file path=ppt/theme/theme2.xml><?xml version="1.0" encoding="utf-8"?>
+<a:theme xmlns:a="http://schemas.openxmlformats.org/drawingml/2006/main" name="Office Theme">
+  <a:themeElements>
+    <a:clrScheme name="Office">
+      <a:dk1>
+        <a:sysClr val="windowText" lastClr="000000"/>
+      </a:dk1>
+      <a:lt1>
+        <a:sysClr val="window" lastClr="FFFFFF"/>
+      </a:lt1>
+      <a:dk2>
+        <a:srgbClr val="1F497D"/>
+      </a:dk2>
+      <a:lt2>
+        <a:srgbClr val="EEECE1"/>
+      </a:lt2>
+      <a:accent1>
+        <a:srgbClr val="4F81BD"/>
+      </a:accent1>
+      <a:accent2>
+        <a:srgbClr val="C0504D"/>
+      </a:accent2>
+      <a:accent3>
+        <a:srgbClr val="9BBB59"/>
+      </a:accent3>
+      <a:accent4>
+        <a:srgbClr val="8064A2"/>
+      </a:accent4>
+      <a:accent5>
+        <a:srgbClr val="4BACC6"/>
+      </a:accent5>
+      <a:accent6>
+        <a:srgbClr val="F79646"/>
+      </a:accent6>
+      <a:hlink>
+        <a:srgbClr val="0000FF"/>
+      </a:hlink>
+      <a:folHlink>
+        <a:srgbClr val="800080"/>
+      </a:folHlink>
+    </a:clrScheme>
+    <a:fontScheme name="Office">
+      <a:majorFont>
+        <a:latin typeface="Calibri"/>
+        <a:ea typeface=""/>
+        <a:cs typeface=""/>
+        <a:font script="Jpan" typeface="ＭＳ Ｐゴシック"/>
+        <a:font script="Hang" typeface="맑은 고딕"/>
+        <a:font script="Hans" typeface="宋体"/>
+        <a:font script="Hant" typeface="新細明體"/>
+        <a:font script="Arab" typeface="Times New Roman"/>
+        <a:font script="Hebr" typeface="Times New Roman"/>
+        <a:font script="Thai" typeface="Angsana New"/>
+        <a:font script="Ethi" typeface="Nyala"/>
+        <a:font script="Beng" typeface="Vrinda"/>
+        <a:font script="Gujr" typeface="Shruti"/>
+        <a:font script="Khmr" typeface="MoolBoran"/>
+        <a:font script="Knda" typeface="Tunga"/>
+        <a:font script="Guru" typeface="Raavi"/>
+        <a:font script="Cans" typeface="Euphemia"/>
+        <a:font script="Cher" typeface="Plantagenet Cherokee"/>
+        <a:font script="Yiii" typeface="Microsoft Yi Baiti"/>
+        <a:font script="Tibt" typeface="Microsoft Himalaya"/>
+        <a:font script="Thaa" typeface="MV Boli"/>
+        <a:font script="Deva" typeface="Mangal"/>
+        <a:font script="Telu" typeface="Gautami"/>
+        <a:font script="Taml" typeface="Latha"/>
+        <a:font script="Syrc" typeface="Estrangelo Edessa"/>
+        <a:font script="Orya" typeface="Kalinga"/>
+        <a:font script="Mlym" typeface="Kartika"/>
+        <a:font script="Laoo" typeface="DokChampa"/>
+        <a:font script="Sinh" typeface="Iskoola Pota"/>
+        <a:font script="Mong" typeface="Mongolian Baiti"/>
+        <a:font script="Viet" typeface="Times New Roman"/>
+        <a:font script="Uigh" typeface="Microsoft Uighur"/>
+      </a:majorFont>
+      <a:minorFont>
+        <a:latin typeface="Calibri"/>
+        <a:ea typeface=""/>
+        <a:cs typeface=""/>
+        <a:font script="Jpan" typeface="ＭＳ Ｐゴシック"/>
+        <a:font script="Hang" typeface="맑은 고딕"/>
+        <a:font script="Hans" typeface="宋体"/>
+        <a:font script="Hant" typeface="新細明體"/>
+        <a:font script="Arab" typeface="Arial"/>
+        <a:font script="Hebr" typeface="Arial"/>
+        <a:font script="Thai" typeface="Cordia New"/>
+        <a:font script="Ethi" typeface="Nyala"/>
+        <a:font script="Beng" typeface="Vrinda"/>
+        <a:font script="Gujr" typeface="Shruti"/>
+        <a:font script="Khmr" typeface="DaunPenh"/>
+        <a:font script="Knda" typeface="Tunga"/>
+        <a:font script="Guru" typeface="Raavi"/>
+        <a:font script="Cans" typeface="Euphemia"/>
+        <a:font script="Cher" typeface="Plantagenet Cherokee"/>
+        <a:font script="Yiii" typeface="Microsoft Yi Baiti"/>
+        <a:font script="Tibt" typeface="Microsoft Himalaya"/>
+        <a:font script="Thaa" typeface="MV Boli"/>
+        <a:font script="Deva" typeface="Mangal"/>
+        <a:font script="Telu" typeface="Gautami"/>
+        <a:font script="Taml" typeface="Latha"/>
+        <a:font script="Syrc" typeface="Estrangelo Edessa"/>
+        <a:font script="Orya" typeface="Kalinga"/>
+        <a:font script="Mlym" typeface="Kartika"/>
+        <a:font script="Laoo" typeface="DokChampa"/>
+        <a:font script="Sinh" typeface="Iskoola Pota"/>
+        <a:font script="Mong" typeface="Mongolian Baiti"/>
+        <a:font script="Viet" typeface="Arial"/>
+        <a:font script="Uigh" typeface="Microsoft Uighur"/>
+      </a:minorFont>
+    </a:fontScheme>
+    <a:fmtScheme name="Office">
+      <a:fillStyleLst>
+        <a:solidFill>
+          <a:schemeClr val="phClr"/>
+        </a:solidFill>
+        <a:gradFill rotWithShape="1">
+          <a:gsLst>
+            <a:gs pos="0">
+              <a:schemeClr val="phClr">
+                <a:tint val="50000"/>
+                <a:satMod val="300000"/>
+              </a:schemeClr>
+            </a:gs>
+            <a:gs pos="35000">
+              <a:schemeClr val="phClr">
+                <a:tint val="37000"/>
+                <a:satMod val="300000"/>
+              </a:schemeClr>
+            </a:gs>
+            <a:gs pos="100000">
+              <a:schemeClr val="phClr">
+                <a:tint val="15000"/>
+                <a:satMod val="350000"/>
+              </a:schemeClr>
+            </a:gs>
+          </a:gsLst>
+          <a:lin ang="16200000" scaled="1"/>
+        </a:gradFill>
+        <a:gradFill rotWithShape="1">
+          <a:gsLst>
+            <a:gs pos="0">
+              <a:schemeClr val="phClr">
+                <a:tint val="100000"/>
+                <a:shade val="100000"/>
+                <a:satMod val="130000"/>
+              </a:schemeClr>
+            </a:gs>
+            <a:gs pos="100000">
+              <a:schemeClr val="phClr">
+                <a:tint val="50000"/>
+                <a:shade val="100000"/>
+                <a:satMod val="350000"/>
+              </a:schemeClr>
+            </a:gs>
+          </a:gsLst>
+          <a:lin ang="16200000" scaled="0"/>
+        </a:gradFill>
+      </a:fillStyleLst>
+      <a:lnStyleLst>
+        <a:ln w="9525" cap="flat" cmpd="sng" algn="ctr">
+          <a:solidFill>
+            <a:schemeClr val="phClr">
+              <a:shade val="95000"/>
+              <a:satMod val="105000"/>
+            </a:schemeClr>
+          </a:solidFill>
+          <a:prstDash val="solid"/>
+        </a:ln>
+        <a:ln w="25400" cap="flat" cmpd="sng" algn="ctr">
+          <a:solidFill>
+            <a:schemeClr val="phClr"/>
+          </a:solidFill>
+          <a:prstDash val="solid"/>
+        </a:ln>
+        <a:ln w="38100" cap="flat" cmpd="sng" algn="ctr">
+          <a:solidFill>
+            <a:schemeClr val="phClr"/>
+          </a:solidFill>
+          <a:prstDash val="solid"/>
+        </a:ln>
+      </a:lnStyleLst>
+      <a:effectStyleLst>
+        <a:effectStyle>
+          <a:effectLst>
+            <a:outerShdw blurRad="40000" dist="20000" dir="5400000" rotWithShape="0">
+              <a:srgbClr val="000000">
+                <a:alpha val="38000"/>
+              </a:srgbClr>
+            </a:outerShdw>
+          </a:effectLst>
+        </a:effectStyle>
+        <a:effectStyle>
+          <a:effectLst>
+            <a:outerShdw blurRad="40000" dist="23000" dir="5400000" rotWithShape="0">
+              <a:srgbClr val="000000">
+                <a:alpha val="35000"/>
+              </a:srgbClr>
+            </a:outerShdw>
+          </a:effectLst>
+        </a:effectStyle>
+        <a:effectStyle>
+          <a:effectLst>
+            <a:outerShdw blurRad="40000" dist="23000" dir="5400000" rotWithShape="0">
+              <a:srgbClr val="000000">
+                <a:alpha val="35000"/>
+              </a:srgbClr>
+            </a:outerShdw>
+          </a:effectLst>
+          <a:scene3d>
+            <a:camera prst="orthographicFront">
+              <a:rot lat="0" lon="0" rev="0"/>
+            </a:camera>
+            <a:lightRig rig="threePt" dir="t">
+              <a:rot lat="0" lon="0" rev="1200000"/>
+            </a:lightRig>
+          </a:scene3d>
+          <a:sp3d>
+            <a:bevelT w="63500" h="25400"/>
+          </a:sp3d>
+        </a:effectStyle>
+      </a:effectStyleLst>
+      <a:bgFillStyleLst>
+        <a:solidFill>
+          <a:schemeClr val="phClr"/>
+        </a:solidFill>
+        <a:gradFill rotWithShape="1">
+          <a:gsLst>
+            <a:gs pos="0">
+              <a:schemeClr val="phClr">
+                <a:tint val="40000"/>
+                <a:satMod val="350000"/>
+              </a:schemeClr>
+            </a:gs>
+            <a:gs pos="40000">
+              <a:schemeClr val="phClr">
+                <a:tint val="45000"/>
+                <a:shade val="99000"/>
+                <a:satMod val="350000"/>
+              </a:schemeClr>
+            </a:gs>
+            <a:gs pos="100000">
+              <a:schemeClr val="phClr">
+                <a:shade val="20000"/>
+                <a:satMod val="255000"/>
+              </a:schemeClr>
+            </a:gs>
+          </a:gsLst>
+          <a:path path="circle">
+            <a:fillToRect l="50000" t="-80000" r="50000" b="180000"/>
+          </a:path>
+        </a:gradFill>
+        <a:gradFill rotWithShape="1">
+          <a:gsLst>
+            <a:gs pos="0">
+              <a:schemeClr val="phClr">
+                <a:tint val="80000"/>
+                <a:satMod val="300000"/>
+              </a:schemeClr>
+            </a:gs>
+            <a:gs pos="100000">
+              <a:schemeClr val="phClr">
+                <a:shade val="30000"/>
+                <a:satMod val="200000"/>
+              </a:schemeClr>
+            </a:gs>
+          </a:gsLst>
+          <a:path path="circle">
+            <a:fillToRect l="50000" t="50000" r="50000" b="50000"/>
+          </a:path>
+        </a:gradFill>
+      </a:bgFillStyleLst>
+    </a:fmtScheme>
+  </a:themeElements>
+  <a:objectDefaults>
+    <a:spDef>
+      <a:spPr/>
+      <a:bodyPr/>
+      <a:lstStyle/>
+      <a:style>
+        <a:lnRef idx="1">
+          <a:schemeClr val="accent1"/>
+        </a:lnRef>
+        <a:fillRef idx="3">
+          <a:schemeClr val="accent1"/>
+        </a:fillRef>
+        <a:effectRef idx="2">
+          <a:schemeClr val="accent1"/>
+        </a:effectRef>
+        <a:fontRef idx="minor">
+          <a:schemeClr val="lt1"/>
+        </a:fontRef>
+      </a:style>
+    </a:spDef>
+    <a:lnDef>
+      <a:spPr/>
+      <a:bodyPr/>
+      <a:lstStyle/>
+      <a:style>
+        <a:lnRef idx="2">
+          <a:schemeClr val="accent1"/>
+        </a:lnRef>
+        <a:fillRef idx="0">
+          <a:schemeClr val="accent1"/>
+        </a:fillRef>
+        <a:effectRef idx="1">
+          <a:schemeClr val="accent1"/>
+        </a:effectRef>
+        <a:fontRef idx="minor">
+          <a:schemeClr val="tx1"/>
+        </a:fontRef>
+      </a:style>
+    </a:lnDef>
+  </a:objectDefaults>
+  <a:extraClrSchemeLst/>
+</a:theme>
 </file>
</xml_diff>

<commit_message>
added page for downloading answers_d2s1 branch with answers to Exercises
</commit_message>
<xml_diff>
--- a/doc/slides/day2/session1/SamFormatAndFiltering.pptx
+++ b/doc/slides/day2/session1/SamFormatAndFiltering.pptx
@@ -5,7 +5,7 @@
     <p:sldMasterId id="2147483648" r:id="rId1"/>
   </p:sldMasterIdLst>
   <p:notesMasterIdLst>
-    <p:notesMasterId r:id="rId9"/>
+    <p:notesMasterId r:id="rId10"/>
   </p:notesMasterIdLst>
   <p:sldIdLst>
     <p:sldId id="263" r:id="rId2"/>
@@ -15,6 +15,7 @@
     <p:sldId id="259" r:id="rId6"/>
     <p:sldId id="260" r:id="rId7"/>
     <p:sldId id="262" r:id="rId8"/>
+    <p:sldId id="264" r:id="rId9"/>
   </p:sldIdLst>
   <p:sldSz cx="9144000" cy="6858000" type="screen4x3"/>
   <p:notesSz cx="6858000" cy="9144000"/>
@@ -198,7 +199,8 @@
           <a:p>
             <a:fld id="{11D2843E-FABA-5647-BE09-469D1564CF94}" type="datetimeFigureOut">
               <a:rPr lang="en-US" smtClean="0"/>
-              <a:t>9/8/12</a:t>
+              <a:pPr/>
+              <a:t>9/10/12</a:t>
             </a:fld>
             <a:endParaRPr lang="en-US"/>
           </a:p>
@@ -359,6 +361,7 @@
           <a:p>
             <a:fld id="{C7D22C1A-5C65-4B44-A3E8-333699168EE8}" type="slidenum">
               <a:rPr lang="en-US" smtClean="0"/>
+              <a:pPr/>
               <a:t>‹#›</a:t>
             </a:fld>
             <a:endParaRPr lang="en-US"/>
@@ -739,7 +742,7 @@
             <a:fld id="{92EB5B03-E054-B54F-97A5-9471F82931B5}" type="datetimeFigureOut">
               <a:rPr lang="en-US" smtClean="0"/>
               <a:pPr/>
-              <a:t>9/8/12</a:t>
+              <a:t>9/10/12</a:t>
             </a:fld>
             <a:endParaRPr lang="en-US"/>
           </a:p>
@@ -906,7 +909,7 @@
             <a:fld id="{92EB5B03-E054-B54F-97A5-9471F82931B5}" type="datetimeFigureOut">
               <a:rPr lang="en-US" smtClean="0"/>
               <a:pPr/>
-              <a:t>9/8/12</a:t>
+              <a:t>9/10/12</a:t>
             </a:fld>
             <a:endParaRPr lang="en-US"/>
           </a:p>
@@ -1083,7 +1086,7 @@
             <a:fld id="{92EB5B03-E054-B54F-97A5-9471F82931B5}" type="datetimeFigureOut">
               <a:rPr lang="en-US" smtClean="0"/>
               <a:pPr/>
-              <a:t>9/8/12</a:t>
+              <a:t>9/10/12</a:t>
             </a:fld>
             <a:endParaRPr lang="en-US"/>
           </a:p>
@@ -1250,7 +1253,7 @@
             <a:fld id="{92EB5B03-E054-B54F-97A5-9471F82931B5}" type="datetimeFigureOut">
               <a:rPr lang="en-US" smtClean="0"/>
               <a:pPr/>
-              <a:t>9/8/12</a:t>
+              <a:t>9/10/12</a:t>
             </a:fld>
             <a:endParaRPr lang="en-US"/>
           </a:p>
@@ -1493,7 +1496,7 @@
             <a:fld id="{92EB5B03-E054-B54F-97A5-9471F82931B5}" type="datetimeFigureOut">
               <a:rPr lang="en-US" smtClean="0"/>
               <a:pPr/>
-              <a:t>9/8/12</a:t>
+              <a:t>9/10/12</a:t>
             </a:fld>
             <a:endParaRPr lang="en-US"/>
           </a:p>
@@ -1778,7 +1781,7 @@
             <a:fld id="{92EB5B03-E054-B54F-97A5-9471F82931B5}" type="datetimeFigureOut">
               <a:rPr lang="en-US" smtClean="0"/>
               <a:pPr/>
-              <a:t>9/8/12</a:t>
+              <a:t>9/10/12</a:t>
             </a:fld>
             <a:endParaRPr lang="en-US"/>
           </a:p>
@@ -2197,7 +2200,7 @@
             <a:fld id="{92EB5B03-E054-B54F-97A5-9471F82931B5}" type="datetimeFigureOut">
               <a:rPr lang="en-US" smtClean="0"/>
               <a:pPr/>
-              <a:t>9/8/12</a:t>
+              <a:t>9/10/12</a:t>
             </a:fld>
             <a:endParaRPr lang="en-US"/>
           </a:p>
@@ -2312,7 +2315,7 @@
             <a:fld id="{92EB5B03-E054-B54F-97A5-9471F82931B5}" type="datetimeFigureOut">
               <a:rPr lang="en-US" smtClean="0"/>
               <a:pPr/>
-              <a:t>9/8/12</a:t>
+              <a:t>9/10/12</a:t>
             </a:fld>
             <a:endParaRPr lang="en-US"/>
           </a:p>
@@ -2404,7 +2407,7 @@
             <a:fld id="{92EB5B03-E054-B54F-97A5-9471F82931B5}" type="datetimeFigureOut">
               <a:rPr lang="en-US" smtClean="0"/>
               <a:pPr/>
-              <a:t>9/8/12</a:t>
+              <a:t>9/10/12</a:t>
             </a:fld>
             <a:endParaRPr lang="en-US"/>
           </a:p>
@@ -2678,7 +2681,7 @@
             <a:fld id="{92EB5B03-E054-B54F-97A5-9471F82931B5}" type="datetimeFigureOut">
               <a:rPr lang="en-US" smtClean="0"/>
               <a:pPr/>
-              <a:t>9/8/12</a:t>
+              <a:t>9/10/12</a:t>
             </a:fld>
             <a:endParaRPr lang="en-US"/>
           </a:p>
@@ -2928,7 +2931,7 @@
             <a:fld id="{92EB5B03-E054-B54F-97A5-9471F82931B5}" type="datetimeFigureOut">
               <a:rPr lang="en-US" smtClean="0"/>
               <a:pPr/>
-              <a:t>9/8/12</a:t>
+              <a:t>9/10/12</a:t>
             </a:fld>
             <a:endParaRPr lang="en-US"/>
           </a:p>
@@ -3138,7 +3141,7 @@
             <a:fld id="{92EB5B03-E054-B54F-97A5-9471F82931B5}" type="datetimeFigureOut">
               <a:rPr lang="en-US" smtClean="0"/>
               <a:pPr/>
-              <a:t>9/8/12</a:t>
+              <a:t>9/10/12</a:t>
             </a:fld>
             <a:endParaRPr lang="en-US"/>
           </a:p>
@@ -3526,46 +3529,30 @@
           <a:p>
             <a:r>
               <a:rPr lang="en-US" dirty="0" smtClean="0"/>
-              <a:t>Sam</a:t>
-            </a:r>
+              <a:t>Sam Format &amp; Filtering</a:t>
+            </a:r>
+            <a:endParaRPr lang="en-US" dirty="0"/>
+          </a:p>
+        </p:txBody>
+      </p:sp>
+      <p:sp>
+        <p:nvSpPr>
+          <p:cNvPr id="3" name="Subtitle 2"/>
+          <p:cNvSpPr>
+            <a:spLocks noGrp="1"/>
+          </p:cNvSpPr>
+          <p:nvPr>
+            <p:ph type="subTitle" idx="1"/>
+          </p:nvPr>
+        </p:nvSpPr>
+        <p:spPr/>
+        <p:txBody>
+          <a:bodyPr/>
+          <a:lstStyle/>
+          <a:p>
             <a:r>
               <a:rPr lang="en-US" dirty="0" smtClean="0"/>
-              <a:t> Format &amp; Filtering</a:t>
-            </a:r>
-            <a:endParaRPr lang="en-US" dirty="0"/>
-          </a:p>
-        </p:txBody>
-      </p:sp>
-      <p:sp>
-        <p:nvSpPr>
-          <p:cNvPr id="3" name="Subtitle 2"/>
-          <p:cNvSpPr>
-            <a:spLocks noGrp="1"/>
-          </p:cNvSpPr>
-          <p:nvPr>
-            <p:ph type="subTitle" idx="1"/>
-          </p:nvPr>
-        </p:nvSpPr>
-        <p:spPr/>
-        <p:txBody>
-          <a:bodyPr/>
-          <a:lstStyle/>
-          <a:p>
-            <a:r>
-              <a:rPr lang="en-US" dirty="0" smtClean="0"/>
-              <a:t>12 September 2012,</a:t>
-            </a:r>
-            <a:r>
-              <a:rPr lang="en-US" dirty="0" smtClean="0"/>
-              <a:t> 10.00</a:t>
-            </a:r>
-            <a:r>
-              <a:rPr lang="en-US" dirty="0" smtClean="0"/>
-              <a:t>-</a:t>
-            </a:r>
-            <a:r>
-              <a:rPr lang="en-US" dirty="0" smtClean="0"/>
-              <a:t>10.30</a:t>
+              <a:t>12 September 2012, 10.00-10.30</a:t>
             </a:r>
             <a:endParaRPr lang="en-US" dirty="0"/>
           </a:p>
@@ -4431,6 +4418,136 @@
               <a:t> file</a:t>
             </a:r>
             <a:endParaRPr lang="en-US" dirty="0"/>
+          </a:p>
+        </p:txBody>
+      </p:sp>
+    </p:spTree>
+  </p:cSld>
+  <p:clrMapOvr>
+    <a:masterClrMapping/>
+  </p:clrMapOvr>
+</p:sld>
+</file>
+
+<file path=ppt/slides/slide8.xml><?xml version="1.0" encoding="utf-8"?>
+<p:sld xmlns:a="http://schemas.openxmlformats.org/drawingml/2006/main" xmlns:r="http://schemas.openxmlformats.org/officeDocument/2006/relationships" xmlns:mc="http://schemas.openxmlformats.org/markup-compatibility/2006" xmlns:mv="urn:schemas-microsoft-com:mac:vml" xmlns:p="http://schemas.openxmlformats.org/presentationml/2006/main" mc:Ignorable="mv" mc:PreserveAttributes="mv:*">
+  <p:cSld>
+    <p:spTree>
+      <p:nvGrpSpPr>
+        <p:cNvPr id="1" name=""/>
+        <p:cNvGrpSpPr/>
+        <p:nvPr/>
+      </p:nvGrpSpPr>
+      <p:grpSpPr>
+        <a:xfrm>
+          <a:off x="0" y="0"/>
+          <a:ext cx="0" cy="0"/>
+          <a:chOff x="0" y="0"/>
+          <a:chExt cx="0" cy="0"/>
+        </a:xfrm>
+      </p:grpSpPr>
+      <p:sp>
+        <p:nvSpPr>
+          <p:cNvPr id="2" name="Title 1"/>
+          <p:cNvSpPr>
+            <a:spLocks noGrp="1"/>
+          </p:cNvSpPr>
+          <p:nvPr>
+            <p:ph type="title"/>
+          </p:nvPr>
+        </p:nvSpPr>
+        <p:spPr/>
+        <p:txBody>
+          <a:bodyPr/>
+          <a:lstStyle/>
+          <a:p>
+            <a:r>
+              <a:rPr lang="en-US" dirty="0" smtClean="0"/>
+              <a:t>Answers (</a:t>
+            </a:r>
+            <a:r>
+              <a:rPr lang="en-US" dirty="0" err="1" smtClean="0"/>
+              <a:t>dont</a:t>
+            </a:r>
+            <a:r>
+              <a:rPr lang="en-US" dirty="0" smtClean="0"/>
+              <a:t> cheat)</a:t>
+            </a:r>
+            <a:endParaRPr lang="en-US" dirty="0"/>
+          </a:p>
+        </p:txBody>
+      </p:sp>
+      <p:sp>
+        <p:nvSpPr>
+          <p:cNvPr id="3" name="Content Placeholder 2"/>
+          <p:cNvSpPr>
+            <a:spLocks noGrp="1"/>
+          </p:cNvSpPr>
+          <p:nvPr>
+            <p:ph idx="1"/>
+          </p:nvPr>
+        </p:nvSpPr>
+        <p:spPr/>
+        <p:txBody>
+          <a:bodyPr/>
+          <a:lstStyle/>
+          <a:p>
+            <a:pPr>
+              <a:buNone/>
+            </a:pPr>
+            <a:endParaRPr lang="en-US" dirty="0" smtClean="0"/>
+          </a:p>
+          <a:p>
+            <a:pPr>
+              <a:buFont typeface="Wingdings" charset="2"/>
+              <a:buChar char="Ø"/>
+            </a:pPr>
+            <a:r>
+              <a:rPr lang="en-US" dirty="0" err="1" smtClean="0"/>
+              <a:t>git</a:t>
+            </a:r>
+            <a:r>
+              <a:rPr lang="en-US" dirty="0" smtClean="0"/>
+              <a:t> checkout –</a:t>
+            </a:r>
+            <a:r>
+              <a:rPr lang="en-US" dirty="0" err="1" smtClean="0"/>
+              <a:t>b</a:t>
+            </a:r>
+            <a:r>
+              <a:rPr lang="en-US" dirty="0" smtClean="0"/>
+              <a:t> answers_d2s1 origin/answers_d2s1</a:t>
+            </a:r>
+          </a:p>
+          <a:p>
+            <a:pPr>
+              <a:buFont typeface="Wingdings" charset="2"/>
+              <a:buChar char="Ø"/>
+            </a:pPr>
+            <a:r>
+              <a:rPr lang="en-US" dirty="0" smtClean="0"/>
+              <a:t>edit </a:t>
+            </a:r>
+            <a:r>
+              <a:rPr lang="en-US" dirty="0" err="1" smtClean="0"/>
+              <a:t>src/filter_sam.pl</a:t>
+            </a:r>
+            <a:endParaRPr lang="en-US" dirty="0" smtClean="0"/>
+          </a:p>
+          <a:p>
+            <a:pPr>
+              <a:buFont typeface="Wingdings" charset="2"/>
+              <a:buChar char="Ø"/>
+            </a:pPr>
+            <a:r>
+              <a:rPr lang="en-US" dirty="0" smtClean="0"/>
+              <a:t>edit/run </a:t>
+            </a:r>
+            <a:r>
+              <a:rPr lang="en-US" dirty="0" err="1" smtClean="0"/>
+              <a:t>src/Plasmodium.sh</a:t>
+            </a:r>
+            <a:endParaRPr lang="en-US" dirty="0" smtClean="0"/>
           </a:p>
         </p:txBody>
       </p:sp>

</xml_diff>

<commit_message>
added answer pages to the end minor changes elsewhere
</commit_message>
<xml_diff>
--- a/doc/slides/day2/session1/SamFormatAndFiltering.pptx
+++ b/doc/slides/day2/session1/SamFormatAndFiltering.pptx
@@ -4545,7 +4545,30 @@
             </a:r>
             <a:r>
               <a:rPr lang="en-US" dirty="0" err="1" smtClean="0"/>
-              <a:t>src/Plasmodium.sh</a:t>
+              <a:t>src/</a:t>
+            </a:r>
+            <a:r>
+              <a:rPr lang="en-US" dirty="0" err="1" smtClean="0"/>
+              <a:t>Plasmodium.sh</a:t>
+            </a:r>
+            <a:endParaRPr lang="en-US" dirty="0" smtClean="0"/>
+          </a:p>
+          <a:p>
+            <a:pPr>
+              <a:buFont typeface="Wingdings" charset="2"/>
+              <a:buChar char="Ø"/>
+            </a:pPr>
+            <a:r>
+              <a:rPr lang="en-US" dirty="0" err="1" smtClean="0"/>
+              <a:t>git</a:t>
+            </a:r>
+            <a:r>
+              <a:rPr lang="en-US" dirty="0" smtClean="0"/>
+              <a:t> </a:t>
+            </a:r>
+            <a:r>
+              <a:rPr lang="en-US" smtClean="0"/>
+              <a:t>checkout master</a:t>
             </a:r>
             <a:endParaRPr lang="en-US" dirty="0" smtClean="0"/>
           </a:p>

</xml_diff>